<commit_message>
fixed code error in ppt
Fixed a code error in the accessing arrays demo.  Added a second demo
with the examScores example.
</commit_message>
<xml_diff>
--- a/ARCC/intro_to_arrays_in_cpp/intro_to_arrays_in_cpp.pptx
+++ b/ARCC/intro_to_arrays_in_cpp/intro_to_arrays_in_cpp.pptx
@@ -5,7 +5,7 @@
     <p:sldMasterId id="2147483648" r:id="rId1"/>
   </p:sldMasterIdLst>
   <p:notesMasterIdLst>
-    <p:notesMasterId r:id="rId20"/>
+    <p:notesMasterId r:id="rId21"/>
   </p:notesMasterIdLst>
   <p:sldIdLst>
     <p:sldId id="256" r:id="rId2"/>
@@ -18,14 +18,15 @@
     <p:sldId id="263" r:id="rId9"/>
     <p:sldId id="264" r:id="rId10"/>
     <p:sldId id="265" r:id="rId11"/>
-    <p:sldId id="266" r:id="rId12"/>
-    <p:sldId id="267" r:id="rId13"/>
-    <p:sldId id="268" r:id="rId14"/>
-    <p:sldId id="269" r:id="rId15"/>
-    <p:sldId id="273" r:id="rId16"/>
-    <p:sldId id="270" r:id="rId17"/>
-    <p:sldId id="271" r:id="rId18"/>
-    <p:sldId id="272" r:id="rId19"/>
+    <p:sldId id="274" r:id="rId12"/>
+    <p:sldId id="266" r:id="rId13"/>
+    <p:sldId id="267" r:id="rId14"/>
+    <p:sldId id="268" r:id="rId15"/>
+    <p:sldId id="269" r:id="rId16"/>
+    <p:sldId id="273" r:id="rId17"/>
+    <p:sldId id="270" r:id="rId18"/>
+    <p:sldId id="271" r:id="rId19"/>
+    <p:sldId id="272" r:id="rId20"/>
   </p:sldIdLst>
   <p:sldSz cx="12192000" cy="6858000"/>
   <p:notesSz cx="6858000" cy="9144000"/>
@@ -214,7 +215,7 @@
           <a:p>
             <a:fld id="{6540A87B-23EA-4610-975C-A64FB63536A3}" type="datetimeFigureOut">
               <a:rPr lang="en-US" smtClean="0"/>
-              <a:t>12/27/2015</a:t>
+              <a:t>12/29/2015</a:t>
             </a:fld>
             <a:endParaRPr lang="en-US"/>
           </a:p>
@@ -528,11 +529,33 @@
           <a:p>
             <a:r>
               <a:rPr lang="en-US" smtClean="0"/>
-              <a:t>Offset operator</a:t>
+              <a:t>Indexes must be a “counting” type variable </a:t>
             </a:r>
             <a:r>
               <a:rPr lang="en-US" baseline="0" smtClean="0"/>
-              <a:t> is a special dereference operator.</a:t>
+              <a:t>int, long, or char, not double, string, etc.</a:t>
+            </a:r>
+            <a:endParaRPr lang="en-US" smtClean="0"/>
+          </a:p>
+          <a:p>
+            <a:endParaRPr lang="en-US" smtClean="0"/>
+          </a:p>
+          <a:p>
+            <a:r>
+              <a:rPr lang="en-US" smtClean="0"/>
+              <a:t>Offset </a:t>
+            </a:r>
+            <a:r>
+              <a:rPr lang="en-US" smtClean="0"/>
+              <a:t>operator</a:t>
+            </a:r>
+            <a:r>
+              <a:rPr lang="en-US" baseline="0" smtClean="0"/>
+              <a:t> is a special dereference operator</a:t>
+            </a:r>
+            <a:r>
+              <a:rPr lang="en-US" baseline="0" smtClean="0"/>
+              <a:t>.</a:t>
             </a:r>
             <a:endParaRPr lang="en-US"/>
           </a:p>
@@ -705,7 +728,7 @@
           <a:p>
             <a:fld id="{D852F0DB-ACE2-4427-8DE7-5959E4CEB239}" type="datetimeFigureOut">
               <a:rPr lang="en-US" smtClean="0"/>
-              <a:t>12/27/2015</a:t>
+              <a:t>12/29/2015</a:t>
             </a:fld>
             <a:endParaRPr lang="en-US"/>
           </a:p>
@@ -875,7 +898,7 @@
           <a:p>
             <a:fld id="{D852F0DB-ACE2-4427-8DE7-5959E4CEB239}" type="datetimeFigureOut">
               <a:rPr lang="en-US" smtClean="0"/>
-              <a:t>12/27/2015</a:t>
+              <a:t>12/29/2015</a:t>
             </a:fld>
             <a:endParaRPr lang="en-US"/>
           </a:p>
@@ -1055,7 +1078,7 @@
           <a:p>
             <a:fld id="{D852F0DB-ACE2-4427-8DE7-5959E4CEB239}" type="datetimeFigureOut">
               <a:rPr lang="en-US" smtClean="0"/>
-              <a:t>12/27/2015</a:t>
+              <a:t>12/29/2015</a:t>
             </a:fld>
             <a:endParaRPr lang="en-US"/>
           </a:p>
@@ -1225,7 +1248,7 @@
           <a:p>
             <a:fld id="{D852F0DB-ACE2-4427-8DE7-5959E4CEB239}" type="datetimeFigureOut">
               <a:rPr lang="en-US" smtClean="0"/>
-              <a:t>12/27/2015</a:t>
+              <a:t>12/29/2015</a:t>
             </a:fld>
             <a:endParaRPr lang="en-US"/>
           </a:p>
@@ -1471,7 +1494,7 @@
           <a:p>
             <a:fld id="{D852F0DB-ACE2-4427-8DE7-5959E4CEB239}" type="datetimeFigureOut">
               <a:rPr lang="en-US" smtClean="0"/>
-              <a:t>12/27/2015</a:t>
+              <a:t>12/29/2015</a:t>
             </a:fld>
             <a:endParaRPr lang="en-US"/>
           </a:p>
@@ -1703,7 +1726,7 @@
           <a:p>
             <a:fld id="{D852F0DB-ACE2-4427-8DE7-5959E4CEB239}" type="datetimeFigureOut">
               <a:rPr lang="en-US" smtClean="0"/>
-              <a:t>12/27/2015</a:t>
+              <a:t>12/29/2015</a:t>
             </a:fld>
             <a:endParaRPr lang="en-US"/>
           </a:p>
@@ -2070,7 +2093,7 @@
           <a:p>
             <a:fld id="{D852F0DB-ACE2-4427-8DE7-5959E4CEB239}" type="datetimeFigureOut">
               <a:rPr lang="en-US" smtClean="0"/>
-              <a:t>12/27/2015</a:t>
+              <a:t>12/29/2015</a:t>
             </a:fld>
             <a:endParaRPr lang="en-US"/>
           </a:p>
@@ -2188,7 +2211,7 @@
           <a:p>
             <a:fld id="{D852F0DB-ACE2-4427-8DE7-5959E4CEB239}" type="datetimeFigureOut">
               <a:rPr lang="en-US" smtClean="0"/>
-              <a:t>12/27/2015</a:t>
+              <a:t>12/29/2015</a:t>
             </a:fld>
             <a:endParaRPr lang="en-US"/>
           </a:p>
@@ -2283,7 +2306,7 @@
           <a:p>
             <a:fld id="{D852F0DB-ACE2-4427-8DE7-5959E4CEB239}" type="datetimeFigureOut">
               <a:rPr lang="en-US" smtClean="0"/>
-              <a:t>12/27/2015</a:t>
+              <a:t>12/29/2015</a:t>
             </a:fld>
             <a:endParaRPr lang="en-US"/>
           </a:p>
@@ -2560,7 +2583,7 @@
           <a:p>
             <a:fld id="{D852F0DB-ACE2-4427-8DE7-5959E4CEB239}" type="datetimeFigureOut">
               <a:rPr lang="en-US" smtClean="0"/>
-              <a:t>12/27/2015</a:t>
+              <a:t>12/29/2015</a:t>
             </a:fld>
             <a:endParaRPr lang="en-US"/>
           </a:p>
@@ -2813,7 +2836,7 @@
           <a:p>
             <a:fld id="{D852F0DB-ACE2-4427-8DE7-5959E4CEB239}" type="datetimeFigureOut">
               <a:rPr lang="en-US" smtClean="0"/>
-              <a:t>12/27/2015</a:t>
+              <a:t>12/29/2015</a:t>
             </a:fld>
             <a:endParaRPr lang="en-US"/>
           </a:p>
@@ -3026,7 +3049,7 @@
           <a:p>
             <a:fld id="{D852F0DB-ACE2-4427-8DE7-5959E4CEB239}" type="datetimeFigureOut">
               <a:rPr lang="en-US" smtClean="0"/>
-              <a:t>12/27/2015</a:t>
+              <a:t>12/29/2015</a:t>
             </a:fld>
             <a:endParaRPr lang="en-US"/>
           </a:p>
@@ -3495,6 +3518,13 @@
   <p:clrMapOvr>
     <a:masterClrMapping/>
   </p:clrMapOvr>
+  <p:timing>
+    <p:tnLst>
+      <p:par>
+        <p:cTn id="1" dur="indefinite" restart="never" nodeType="tmRoot"/>
+      </p:par>
+    </p:tnLst>
+  </p:timing>
 </p:sld>
 </file>
 
@@ -3551,7 +3581,7 @@
         <p:spPr/>
         <p:txBody>
           <a:bodyPr>
-            <a:normAutofit/>
+            <a:normAutofit fontScale="70000" lnSpcReduction="20000"/>
           </a:bodyPr>
           <a:lstStyle/>
           <a:p>
@@ -3574,11 +3604,103 @@
               <a:buNone/>
             </a:pPr>
             <a:r>
+              <a:rPr lang="en-US" sz="1400" b="1">
+                <a:solidFill>
+                  <a:srgbClr val="FF0000"/>
+                </a:solidFill>
+                <a:latin typeface="Courier New" panose="02070309020205020404" pitchFamily="49" charset="0"/>
+                <a:cs typeface="Courier New" panose="02070309020205020404" pitchFamily="49" charset="0"/>
+              </a:rPr>
+              <a:t>int intArray[4] = { 15, 30, 45, 100 };</a:t>
+            </a:r>
+          </a:p>
+          <a:p>
+            <a:pPr marL="0" indent="0">
+              <a:buNone/>
+            </a:pPr>
+            <a:r>
+              <a:rPr lang="en-US" sz="1400">
+                <a:latin typeface="Courier New" panose="02070309020205020404" pitchFamily="49" charset="0"/>
+                <a:cs typeface="Courier New" panose="02070309020205020404" pitchFamily="49" charset="0"/>
+              </a:rPr>
+              <a:t>int arraySize = 4;</a:t>
+            </a:r>
+          </a:p>
+          <a:p>
+            <a:pPr marL="0" indent="0">
+              <a:buNone/>
+            </a:pPr>
+            <a:r>
+              <a:rPr lang="en-US" sz="1400">
+                <a:latin typeface="Courier New" panose="02070309020205020404" pitchFamily="49" charset="0"/>
+                <a:cs typeface="Courier New" panose="02070309020205020404" pitchFamily="49" charset="0"/>
+              </a:rPr>
+              <a:t>int arraySum = 0;</a:t>
+            </a:r>
+          </a:p>
+          <a:p>
+            <a:pPr marL="0" indent="0">
+              <a:buNone/>
+            </a:pPr>
+            <a:r>
+              <a:rPr lang="en-US" sz="1400">
+                <a:latin typeface="Courier New" panose="02070309020205020404" pitchFamily="49" charset="0"/>
+                <a:cs typeface="Courier New" panose="02070309020205020404" pitchFamily="49" charset="0"/>
+              </a:rPr>
+              <a:t>cout &lt;&lt; "intArray values : {";</a:t>
+            </a:r>
+          </a:p>
+          <a:p>
+            <a:pPr marL="0" indent="0">
+              <a:buNone/>
+            </a:pPr>
+            <a:r>
+              <a:rPr lang="en-US" sz="1400">
+                <a:latin typeface="Courier New" panose="02070309020205020404" pitchFamily="49" charset="0"/>
+                <a:cs typeface="Courier New" panose="02070309020205020404" pitchFamily="49" charset="0"/>
+              </a:rPr>
+              <a:t>for (int i = 0; i &lt; arraySize; ++i)</a:t>
+            </a:r>
+          </a:p>
+          <a:p>
+            <a:pPr marL="0" indent="0">
+              <a:buNone/>
+            </a:pPr>
+            <a:r>
+              <a:rPr lang="en-US" sz="1400">
+                <a:latin typeface="Courier New" panose="02070309020205020404" pitchFamily="49" charset="0"/>
+                <a:cs typeface="Courier New" panose="02070309020205020404" pitchFamily="49" charset="0"/>
+              </a:rPr>
+              <a:t>{</a:t>
+            </a:r>
+          </a:p>
+          <a:p>
+            <a:pPr marL="0" indent="0">
+              <a:buNone/>
+            </a:pPr>
+            <a:r>
               <a:rPr lang="en-US" sz="1400" smtClean="0">
                 <a:latin typeface="Courier New" panose="02070309020205020404" pitchFamily="49" charset="0"/>
                 <a:cs typeface="Courier New" panose="02070309020205020404" pitchFamily="49" charset="0"/>
               </a:rPr>
-              <a:t>int intArray[4] = { 15, 30, 45, 100 };</a:t>
+              <a:t>    arraySum </a:t>
+            </a:r>
+            <a:r>
+              <a:rPr lang="en-US" sz="1400">
+                <a:latin typeface="Courier New" panose="02070309020205020404" pitchFamily="49" charset="0"/>
+                <a:cs typeface="Courier New" panose="02070309020205020404" pitchFamily="49" charset="0"/>
+              </a:rPr>
+              <a:t>+= </a:t>
+            </a:r>
+            <a:r>
+              <a:rPr lang="en-US" sz="1400" b="1">
+                <a:solidFill>
+                  <a:srgbClr val="FF0000"/>
+                </a:solidFill>
+                <a:latin typeface="Courier New" panose="02070309020205020404" pitchFamily="49" charset="0"/>
+                <a:cs typeface="Courier New" panose="02070309020205020404" pitchFamily="49" charset="0"/>
+              </a:rPr>
+              <a:t>intArray[i];</a:t>
             </a:r>
           </a:p>
           <a:p>
@@ -3590,7 +3712,24 @@
                 <a:latin typeface="Courier New" panose="02070309020205020404" pitchFamily="49" charset="0"/>
                 <a:cs typeface="Courier New" panose="02070309020205020404" pitchFamily="49" charset="0"/>
               </a:rPr>
-              <a:t>cout &lt;&lt; “intArray values: {“;</a:t>
+              <a:t>    cout </a:t>
+            </a:r>
+            <a:r>
+              <a:rPr lang="en-US" sz="1400">
+                <a:latin typeface="Courier New" panose="02070309020205020404" pitchFamily="49" charset="0"/>
+                <a:cs typeface="Courier New" panose="02070309020205020404" pitchFamily="49" charset="0"/>
+              </a:rPr>
+              <a:t>&lt;&lt; </a:t>
+            </a:r>
+            <a:r>
+              <a:rPr lang="en-US" sz="1400" b="1">
+                <a:solidFill>
+                  <a:srgbClr val="FF0000"/>
+                </a:solidFill>
+                <a:latin typeface="Courier New" panose="02070309020205020404" pitchFamily="49" charset="0"/>
+                <a:cs typeface="Courier New" panose="02070309020205020404" pitchFamily="49" charset="0"/>
+              </a:rPr>
+              <a:t>intArray[i];</a:t>
             </a:r>
           </a:p>
           <a:p>
@@ -3602,67 +3741,64 @@
                 <a:latin typeface="Courier New" panose="02070309020205020404" pitchFamily="49" charset="0"/>
                 <a:cs typeface="Courier New" panose="02070309020205020404" pitchFamily="49" charset="0"/>
               </a:rPr>
-              <a:t>for (size_t i = 0; i &lt; 4; ++i)</a:t>
+              <a:t>    if </a:t>
+            </a:r>
+            <a:r>
+              <a:rPr lang="en-US" sz="1400">
+                <a:latin typeface="Courier New" panose="02070309020205020404" pitchFamily="49" charset="0"/>
+                <a:cs typeface="Courier New" panose="02070309020205020404" pitchFamily="49" charset="0"/>
+              </a:rPr>
+              <a:t>(i &lt; arraySize - 1) cout &lt;&lt; " - ";</a:t>
             </a:r>
           </a:p>
           <a:p>
             <a:pPr marL="0" indent="0">
               <a:buNone/>
             </a:pPr>
+            <a:r>
+              <a:rPr lang="en-US" sz="1400">
+                <a:latin typeface="Courier New" panose="02070309020205020404" pitchFamily="49" charset="0"/>
+                <a:cs typeface="Courier New" panose="02070309020205020404" pitchFamily="49" charset="0"/>
+              </a:rPr>
+              <a:t>}</a:t>
+            </a:r>
+          </a:p>
+          <a:p>
+            <a:pPr marL="0" indent="0">
+              <a:buNone/>
+            </a:pPr>
+            <a:r>
+              <a:rPr lang="en-US" sz="1400">
+                <a:latin typeface="Courier New" panose="02070309020205020404" pitchFamily="49" charset="0"/>
+                <a:cs typeface="Courier New" panose="02070309020205020404" pitchFamily="49" charset="0"/>
+              </a:rPr>
+              <a:t>cout &lt;&lt; "}" &lt;&lt; endl;</a:t>
+            </a:r>
+          </a:p>
+          <a:p>
+            <a:pPr marL="0" indent="0">
+              <a:buNone/>
+            </a:pPr>
+            <a:r>
+              <a:rPr lang="en-US" sz="1400">
+                <a:latin typeface="Courier New" panose="02070309020205020404" pitchFamily="49" charset="0"/>
+                <a:cs typeface="Courier New" panose="02070309020205020404" pitchFamily="49" charset="0"/>
+              </a:rPr>
+              <a:t>cout &lt;&lt; "Sum of values : " &lt;&lt; arraySum &lt;&lt; </a:t>
+            </a:r>
+            <a:r>
+              <a:rPr lang="en-US" sz="1400">
+                <a:latin typeface="Courier New" panose="02070309020205020404" pitchFamily="49" charset="0"/>
+                <a:cs typeface="Courier New" panose="02070309020205020404" pitchFamily="49" charset="0"/>
+              </a:rPr>
+              <a:t>endl</a:t>
+            </a:r>
             <a:r>
               <a:rPr lang="en-US" sz="1400" smtClean="0">
                 <a:latin typeface="Courier New" panose="02070309020205020404" pitchFamily="49" charset="0"/>
                 <a:cs typeface="Courier New" panose="02070309020205020404" pitchFamily="49" charset="0"/>
               </a:rPr>
-              <a:t>{</a:t>
-            </a:r>
-          </a:p>
-          <a:p>
-            <a:pPr marL="0" indent="0">
-              <a:buNone/>
-            </a:pPr>
-            <a:r>
-              <a:rPr lang="en-US" sz="1400" smtClean="0">
-                <a:latin typeface="Courier New" panose="02070309020205020404" pitchFamily="49" charset="0"/>
-                <a:cs typeface="Courier New" panose="02070309020205020404" pitchFamily="49" charset="0"/>
-              </a:rPr>
-              <a:t>	cout &lt;&lt; intArray[i];</a:t>
-            </a:r>
-          </a:p>
-          <a:p>
-            <a:pPr marL="0" indent="0">
-              <a:buNone/>
-            </a:pPr>
-            <a:r>
-              <a:rPr lang="en-US" sz="1400" smtClean="0">
-                <a:latin typeface="Courier New" panose="02070309020205020404" pitchFamily="49" charset="0"/>
-                <a:cs typeface="Courier New" panose="02070309020205020404" pitchFamily="49" charset="0"/>
-              </a:rPr>
-              <a:t>	if (i &lt; arraySize - 1) cout &lt;&lt; “ – “;</a:t>
-            </a:r>
-          </a:p>
-          <a:p>
-            <a:pPr marL="0" indent="0">
-              <a:buNone/>
-            </a:pPr>
-            <a:r>
-              <a:rPr lang="en-US" sz="1400" smtClean="0">
-                <a:latin typeface="Courier New" panose="02070309020205020404" pitchFamily="49" charset="0"/>
-                <a:cs typeface="Courier New" panose="02070309020205020404" pitchFamily="49" charset="0"/>
-              </a:rPr>
-              <a:t>}</a:t>
-            </a:r>
-          </a:p>
-          <a:p>
-            <a:pPr marL="0" indent="0">
-              <a:buNone/>
-            </a:pPr>
-            <a:r>
-              <a:rPr lang="en-US" sz="1400" smtClean="0">
-                <a:latin typeface="Courier New" panose="02070309020205020404" pitchFamily="49" charset="0"/>
-                <a:cs typeface="Courier New" panose="02070309020205020404" pitchFamily="49" charset="0"/>
-              </a:rPr>
-              <a:t>cout &lt;&lt; "}" &lt;&lt; endl;</a:t>
+              <a:t>;</a:t>
             </a:r>
           </a:p>
           <a:p>
@@ -3683,7 +3819,14 @@
                 <a:latin typeface="Courier New" panose="02070309020205020404" pitchFamily="49" charset="0"/>
                 <a:cs typeface="Courier New" panose="02070309020205020404" pitchFamily="49" charset="0"/>
               </a:rPr>
-              <a:t>OUTPUT:</a:t>
+              <a:t>OUTPUT</a:t>
+            </a:r>
+            <a:r>
+              <a:rPr lang="en-US" sz="1400" b="1" smtClean="0">
+                <a:latin typeface="Courier New" panose="02070309020205020404" pitchFamily="49" charset="0"/>
+                <a:cs typeface="Courier New" panose="02070309020205020404" pitchFamily="49" charset="0"/>
+              </a:rPr>
+              <a:t>:</a:t>
             </a:r>
           </a:p>
           <a:p>
@@ -3691,11 +3834,23 @@
               <a:buNone/>
             </a:pPr>
             <a:r>
-              <a:rPr lang="en-US" sz="1400" smtClean="0">
+              <a:rPr lang="en-US" sz="1400">
                 <a:latin typeface="Courier New" panose="02070309020205020404" pitchFamily="49" charset="0"/>
                 <a:cs typeface="Courier New" panose="02070309020205020404" pitchFamily="49" charset="0"/>
               </a:rPr>
-              <a:t>intArray values: {15 – 30 – 45 – 100}</a:t>
+              <a:t>intArray values : {15 - 30 - 45 - 100}</a:t>
+            </a:r>
+          </a:p>
+          <a:p>
+            <a:pPr marL="0" indent="0">
+              <a:buNone/>
+            </a:pPr>
+            <a:r>
+              <a:rPr lang="en-US" sz="1400">
+                <a:latin typeface="Courier New" panose="02070309020205020404" pitchFamily="49" charset="0"/>
+                <a:cs typeface="Courier New" panose="02070309020205020404" pitchFamily="49" charset="0"/>
+              </a:rPr>
+              <a:t>Sum of values : 190</a:t>
             </a:r>
             <a:endParaRPr lang="en-US" sz="1400">
               <a:latin typeface="Courier New" panose="02070309020205020404" pitchFamily="49" charset="0"/>
@@ -3758,6 +3913,484 @@
           <a:p>
             <a:r>
               <a:rPr lang="en-US" smtClean="0"/>
+              <a:t>The Exam Scores Problem</a:t>
+            </a:r>
+            <a:endParaRPr lang="en-US"/>
+          </a:p>
+        </p:txBody>
+      </p:sp>
+      <p:sp>
+        <p:nvSpPr>
+          <p:cNvPr id="3" name="Content Placeholder 2"/>
+          <p:cNvSpPr>
+            <a:spLocks noGrp="1"/>
+          </p:cNvSpPr>
+          <p:nvPr>
+            <p:ph idx="1"/>
+          </p:nvPr>
+        </p:nvSpPr>
+        <p:spPr/>
+        <p:txBody>
+          <a:bodyPr>
+            <a:normAutofit fontScale="47500" lnSpcReduction="20000"/>
+          </a:bodyPr>
+          <a:lstStyle/>
+          <a:p>
+            <a:pPr marL="0" indent="0">
+              <a:spcBef>
+                <a:spcPts val="600"/>
+              </a:spcBef>
+              <a:buNone/>
+            </a:pPr>
+            <a:r>
+              <a:rPr lang="en-US">
+                <a:latin typeface="Courier New" panose="02070309020205020404" pitchFamily="49" charset="0"/>
+                <a:cs typeface="Courier New" panose="02070309020205020404" pitchFamily="49" charset="0"/>
+              </a:rPr>
+              <a:t>double averageExamScore = 0;</a:t>
+            </a:r>
+          </a:p>
+          <a:p>
+            <a:pPr marL="0" indent="0">
+              <a:spcBef>
+                <a:spcPts val="600"/>
+              </a:spcBef>
+              <a:buNone/>
+            </a:pPr>
+            <a:r>
+              <a:rPr lang="en-US">
+                <a:latin typeface="Courier New" panose="02070309020205020404" pitchFamily="49" charset="0"/>
+                <a:cs typeface="Courier New" panose="02070309020205020404" pitchFamily="49" charset="0"/>
+              </a:rPr>
+              <a:t>int examScoreSum = 0;</a:t>
+            </a:r>
+          </a:p>
+          <a:p>
+            <a:pPr marL="0" indent="0">
+              <a:spcBef>
+                <a:spcPts val="600"/>
+              </a:spcBef>
+              <a:buNone/>
+            </a:pPr>
+            <a:r>
+              <a:rPr lang="en-US" b="1">
+                <a:solidFill>
+                  <a:srgbClr val="FF0000"/>
+                </a:solidFill>
+                <a:latin typeface="Courier New" panose="02070309020205020404" pitchFamily="49" charset="0"/>
+                <a:cs typeface="Courier New" panose="02070309020205020404" pitchFamily="49" charset="0"/>
+              </a:rPr>
+              <a:t>int examScores[100] </a:t>
+            </a:r>
+            <a:r>
+              <a:rPr lang="en-US" b="1">
+                <a:solidFill>
+                  <a:srgbClr val="FF0000"/>
+                </a:solidFill>
+                <a:latin typeface="Courier New" panose="02070309020205020404" pitchFamily="49" charset="0"/>
+                <a:cs typeface="Courier New" panose="02070309020205020404" pitchFamily="49" charset="0"/>
+              </a:rPr>
+              <a:t>= </a:t>
+            </a:r>
+            <a:r>
+              <a:rPr lang="en-US" b="1" smtClean="0">
+                <a:solidFill>
+                  <a:srgbClr val="FF0000"/>
+                </a:solidFill>
+                <a:latin typeface="Courier New" panose="02070309020205020404" pitchFamily="49" charset="0"/>
+                <a:cs typeface="Courier New" panose="02070309020205020404" pitchFamily="49" charset="0"/>
+              </a:rPr>
+              <a:t>{};</a:t>
+            </a:r>
+          </a:p>
+          <a:p>
+            <a:pPr marL="0" indent="0">
+              <a:spcBef>
+                <a:spcPts val="600"/>
+              </a:spcBef>
+              <a:buNone/>
+            </a:pPr>
+            <a:endParaRPr lang="en-US" b="1" smtClean="0">
+              <a:solidFill>
+                <a:srgbClr val="FF0000"/>
+              </a:solidFill>
+              <a:latin typeface="Courier New" panose="02070309020205020404" pitchFamily="49" charset="0"/>
+              <a:cs typeface="Courier New" panose="02070309020205020404" pitchFamily="49" charset="0"/>
+            </a:endParaRPr>
+          </a:p>
+          <a:p>
+            <a:pPr marL="0" indent="0">
+              <a:spcBef>
+                <a:spcPts val="600"/>
+              </a:spcBef>
+              <a:buNone/>
+            </a:pPr>
+            <a:r>
+              <a:rPr lang="en-US" smtClean="0">
+                <a:latin typeface="Courier New" panose="02070309020205020404" pitchFamily="49" charset="0"/>
+                <a:cs typeface="Courier New" panose="02070309020205020404" pitchFamily="49" charset="0"/>
+              </a:rPr>
+              <a:t>// </a:t>
+            </a:r>
+            <a:r>
+              <a:rPr lang="en-US">
+                <a:latin typeface="Courier New" panose="02070309020205020404" pitchFamily="49" charset="0"/>
+                <a:cs typeface="Courier New" panose="02070309020205020404" pitchFamily="49" charset="0"/>
+              </a:rPr>
+              <a:t>random exam scores to simulate input of </a:t>
+            </a:r>
+            <a:r>
+              <a:rPr lang="en-US">
+                <a:latin typeface="Courier New" panose="02070309020205020404" pitchFamily="49" charset="0"/>
+                <a:cs typeface="Courier New" panose="02070309020205020404" pitchFamily="49" charset="0"/>
+              </a:rPr>
+              <a:t>A </a:t>
+            </a:r>
+            <a:r>
+              <a:rPr lang="en-US" smtClean="0">
+                <a:latin typeface="Courier New" panose="02070309020205020404" pitchFamily="49" charset="0"/>
+                <a:cs typeface="Courier New" panose="02070309020205020404" pitchFamily="49" charset="0"/>
+              </a:rPr>
+              <a:t>Student //</a:t>
+            </a:r>
+            <a:endParaRPr lang="en-US" b="1">
+              <a:solidFill>
+                <a:srgbClr val="FF0000"/>
+              </a:solidFill>
+              <a:latin typeface="Courier New" panose="02070309020205020404" pitchFamily="49" charset="0"/>
+              <a:cs typeface="Courier New" panose="02070309020205020404" pitchFamily="49" charset="0"/>
+            </a:endParaRPr>
+          </a:p>
+          <a:p>
+            <a:pPr marL="0" indent="0">
+              <a:spcBef>
+                <a:spcPts val="600"/>
+              </a:spcBef>
+              <a:buNone/>
+            </a:pPr>
+            <a:r>
+              <a:rPr lang="en-US">
+                <a:latin typeface="Courier New" panose="02070309020205020404" pitchFamily="49" charset="0"/>
+                <a:cs typeface="Courier New" panose="02070309020205020404" pitchFamily="49" charset="0"/>
+              </a:rPr>
+              <a:t>for (int i = 0; i &lt; 100; ++i)</a:t>
+            </a:r>
+          </a:p>
+          <a:p>
+            <a:pPr marL="0" indent="0">
+              <a:spcBef>
+                <a:spcPts val="600"/>
+              </a:spcBef>
+              <a:buNone/>
+            </a:pPr>
+            <a:r>
+              <a:rPr lang="en-US">
+                <a:latin typeface="Courier New" panose="02070309020205020404" pitchFamily="49" charset="0"/>
+                <a:cs typeface="Courier New" panose="02070309020205020404" pitchFamily="49" charset="0"/>
+              </a:rPr>
+              <a:t>{</a:t>
+            </a:r>
+          </a:p>
+          <a:p>
+            <a:pPr marL="0" indent="0">
+              <a:spcBef>
+                <a:spcPts val="600"/>
+              </a:spcBef>
+              <a:buNone/>
+            </a:pPr>
+            <a:r>
+              <a:rPr lang="en-US" smtClean="0">
+                <a:latin typeface="Courier New" panose="02070309020205020404" pitchFamily="49" charset="0"/>
+                <a:cs typeface="Courier New" panose="02070309020205020404" pitchFamily="49" charset="0"/>
+              </a:rPr>
+              <a:t>    examScores[i</a:t>
+            </a:r>
+            <a:r>
+              <a:rPr lang="en-US">
+                <a:latin typeface="Courier New" panose="02070309020205020404" pitchFamily="49" charset="0"/>
+                <a:cs typeface="Courier New" panose="02070309020205020404" pitchFamily="49" charset="0"/>
+              </a:rPr>
+              <a:t>] = 100 - (rand() % 10); </a:t>
+            </a:r>
+          </a:p>
+          <a:p>
+            <a:pPr marL="0" indent="0">
+              <a:spcBef>
+                <a:spcPts val="600"/>
+              </a:spcBef>
+              <a:buNone/>
+            </a:pPr>
+            <a:r>
+              <a:rPr lang="en-US">
+                <a:latin typeface="Courier New" panose="02070309020205020404" pitchFamily="49" charset="0"/>
+                <a:cs typeface="Courier New" panose="02070309020205020404" pitchFamily="49" charset="0"/>
+              </a:rPr>
+              <a:t>}</a:t>
+            </a:r>
+          </a:p>
+          <a:p>
+            <a:pPr marL="0" indent="0">
+              <a:spcBef>
+                <a:spcPts val="600"/>
+              </a:spcBef>
+              <a:buNone/>
+            </a:pPr>
+            <a:endParaRPr lang="en-US">
+              <a:latin typeface="Courier New" panose="02070309020205020404" pitchFamily="49" charset="0"/>
+              <a:cs typeface="Courier New" panose="02070309020205020404" pitchFamily="49" charset="0"/>
+            </a:endParaRPr>
+          </a:p>
+          <a:p>
+            <a:pPr marL="0" indent="0">
+              <a:spcBef>
+                <a:spcPts val="600"/>
+              </a:spcBef>
+              <a:buNone/>
+            </a:pPr>
+            <a:r>
+              <a:rPr lang="en-US" b="1">
+                <a:solidFill>
+                  <a:srgbClr val="FF0000"/>
+                </a:solidFill>
+                <a:latin typeface="Courier New" panose="02070309020205020404" pitchFamily="49" charset="0"/>
+                <a:cs typeface="Courier New" panose="02070309020205020404" pitchFamily="49" charset="0"/>
+              </a:rPr>
+              <a:t>for (int i = 0; i &lt; 100; ++i)</a:t>
+            </a:r>
+          </a:p>
+          <a:p>
+            <a:pPr marL="0" indent="0">
+              <a:spcBef>
+                <a:spcPts val="600"/>
+              </a:spcBef>
+              <a:buNone/>
+            </a:pPr>
+            <a:r>
+              <a:rPr lang="en-US" b="1">
+                <a:solidFill>
+                  <a:srgbClr val="FF0000"/>
+                </a:solidFill>
+                <a:latin typeface="Courier New" panose="02070309020205020404" pitchFamily="49" charset="0"/>
+                <a:cs typeface="Courier New" panose="02070309020205020404" pitchFamily="49" charset="0"/>
+              </a:rPr>
+              <a:t>{</a:t>
+            </a:r>
+          </a:p>
+          <a:p>
+            <a:pPr marL="0" indent="0">
+              <a:spcBef>
+                <a:spcPts val="600"/>
+              </a:spcBef>
+              <a:buNone/>
+            </a:pPr>
+            <a:r>
+              <a:rPr lang="en-US" b="1" smtClean="0">
+                <a:solidFill>
+                  <a:srgbClr val="FF0000"/>
+                </a:solidFill>
+                <a:latin typeface="Courier New" panose="02070309020205020404" pitchFamily="49" charset="0"/>
+                <a:cs typeface="Courier New" panose="02070309020205020404" pitchFamily="49" charset="0"/>
+              </a:rPr>
+              <a:t>    examScoreSum </a:t>
+            </a:r>
+            <a:r>
+              <a:rPr lang="en-US" b="1">
+                <a:solidFill>
+                  <a:srgbClr val="FF0000"/>
+                </a:solidFill>
+                <a:latin typeface="Courier New" panose="02070309020205020404" pitchFamily="49" charset="0"/>
+                <a:cs typeface="Courier New" panose="02070309020205020404" pitchFamily="49" charset="0"/>
+              </a:rPr>
+              <a:t>+= examScores[i];</a:t>
+            </a:r>
+          </a:p>
+          <a:p>
+            <a:pPr marL="0" indent="0">
+              <a:spcBef>
+                <a:spcPts val="600"/>
+              </a:spcBef>
+              <a:buNone/>
+            </a:pPr>
+            <a:r>
+              <a:rPr lang="en-US" b="1">
+                <a:solidFill>
+                  <a:srgbClr val="FF0000"/>
+                </a:solidFill>
+                <a:latin typeface="Courier New" panose="02070309020205020404" pitchFamily="49" charset="0"/>
+                <a:cs typeface="Courier New" panose="02070309020205020404" pitchFamily="49" charset="0"/>
+              </a:rPr>
+              <a:t>}</a:t>
+            </a:r>
+          </a:p>
+          <a:p>
+            <a:pPr marL="0" indent="0">
+              <a:spcBef>
+                <a:spcPts val="600"/>
+              </a:spcBef>
+              <a:buNone/>
+            </a:pPr>
+            <a:r>
+              <a:rPr lang="en-US">
+                <a:latin typeface="Courier New" panose="02070309020205020404" pitchFamily="49" charset="0"/>
+                <a:cs typeface="Courier New" panose="02070309020205020404" pitchFamily="49" charset="0"/>
+              </a:rPr>
+              <a:t>averageExamScore = </a:t>
+            </a:r>
+            <a:r>
+              <a:rPr lang="en-US" b="1">
+                <a:solidFill>
+                  <a:srgbClr val="FF0000"/>
+                </a:solidFill>
+                <a:latin typeface="Courier New" panose="02070309020205020404" pitchFamily="49" charset="0"/>
+                <a:cs typeface="Courier New" panose="02070309020205020404" pitchFamily="49" charset="0"/>
+              </a:rPr>
+              <a:t>examScoreSum</a:t>
+            </a:r>
+            <a:r>
+              <a:rPr lang="en-US">
+                <a:solidFill>
+                  <a:srgbClr val="FF0000"/>
+                </a:solidFill>
+                <a:latin typeface="Courier New" panose="02070309020205020404" pitchFamily="49" charset="0"/>
+                <a:cs typeface="Courier New" panose="02070309020205020404" pitchFamily="49" charset="0"/>
+              </a:rPr>
+              <a:t> </a:t>
+            </a:r>
+            <a:r>
+              <a:rPr lang="en-US">
+                <a:latin typeface="Courier New" panose="02070309020205020404" pitchFamily="49" charset="0"/>
+                <a:cs typeface="Courier New" panose="02070309020205020404" pitchFamily="49" charset="0"/>
+              </a:rPr>
+              <a:t>/ 100.0;</a:t>
+            </a:r>
+          </a:p>
+          <a:p>
+            <a:pPr marL="0" indent="0">
+              <a:spcBef>
+                <a:spcPts val="600"/>
+              </a:spcBef>
+              <a:buNone/>
+            </a:pPr>
+            <a:r>
+              <a:rPr lang="en-US">
+                <a:latin typeface="Courier New" panose="02070309020205020404" pitchFamily="49" charset="0"/>
+                <a:cs typeface="Courier New" panose="02070309020205020404" pitchFamily="49" charset="0"/>
+              </a:rPr>
+              <a:t>cout &lt;&lt; "Average Exam Score: " &lt;&lt; averageExamScore &lt;&lt; </a:t>
+            </a:r>
+            <a:r>
+              <a:rPr lang="en-US">
+                <a:latin typeface="Courier New" panose="02070309020205020404" pitchFamily="49" charset="0"/>
+                <a:cs typeface="Courier New" panose="02070309020205020404" pitchFamily="49" charset="0"/>
+              </a:rPr>
+              <a:t>endl</a:t>
+            </a:r>
+            <a:r>
+              <a:rPr lang="en-US" smtClean="0">
+                <a:latin typeface="Courier New" panose="02070309020205020404" pitchFamily="49" charset="0"/>
+                <a:cs typeface="Courier New" panose="02070309020205020404" pitchFamily="49" charset="0"/>
+              </a:rPr>
+              <a:t>;</a:t>
+            </a:r>
+          </a:p>
+          <a:p>
+            <a:pPr marL="0" indent="0">
+              <a:spcBef>
+                <a:spcPts val="600"/>
+              </a:spcBef>
+              <a:buNone/>
+            </a:pPr>
+            <a:endParaRPr lang="en-US">
+              <a:latin typeface="Courier New" panose="02070309020205020404" pitchFamily="49" charset="0"/>
+              <a:cs typeface="Courier New" panose="02070309020205020404" pitchFamily="49" charset="0"/>
+            </a:endParaRPr>
+          </a:p>
+          <a:p>
+            <a:pPr marL="0" indent="0">
+              <a:spcBef>
+                <a:spcPts val="600"/>
+              </a:spcBef>
+              <a:buNone/>
+            </a:pPr>
+            <a:r>
+              <a:rPr lang="en-US" sz="3400" b="1" smtClean="0">
+                <a:latin typeface="Courier New" panose="02070309020205020404" pitchFamily="49" charset="0"/>
+                <a:cs typeface="Courier New" panose="02070309020205020404" pitchFamily="49" charset="0"/>
+              </a:rPr>
+              <a:t>Output:</a:t>
+            </a:r>
+          </a:p>
+          <a:p>
+            <a:pPr marL="0" indent="0">
+              <a:spcBef>
+                <a:spcPts val="600"/>
+              </a:spcBef>
+              <a:buNone/>
+            </a:pPr>
+            <a:r>
+              <a:rPr lang="en-US">
+                <a:latin typeface="Courier New" panose="02070309020205020404" pitchFamily="49" charset="0"/>
+                <a:cs typeface="Courier New" panose="02070309020205020404" pitchFamily="49" charset="0"/>
+              </a:rPr>
+              <a:t>Average Exam Score: 95.52</a:t>
+            </a:r>
+          </a:p>
+        </p:txBody>
+      </p:sp>
+    </p:spTree>
+    <p:extLst>
+      <p:ext uri="{BB962C8B-B14F-4D97-AF65-F5344CB8AC3E}">
+        <p14:creationId xmlns:p14="http://schemas.microsoft.com/office/powerpoint/2010/main" val="430065080"/>
+      </p:ext>
+    </p:extLst>
+  </p:cSld>
+  <p:clrMapOvr>
+    <a:masterClrMapping/>
+  </p:clrMapOvr>
+  <p:timing>
+    <p:tnLst>
+      <p:par>
+        <p:cTn id="1" dur="indefinite" restart="never" nodeType="tmRoot"/>
+      </p:par>
+    </p:tnLst>
+  </p:timing>
+</p:sld>
+</file>
+
+<file path=ppt/slides/slide12.xml><?xml version="1.0" encoding="utf-8"?>
+<p:sld xmlns:a="http://schemas.openxmlformats.org/drawingml/2006/main" xmlns:r="http://schemas.openxmlformats.org/officeDocument/2006/relationships" xmlns:p="http://schemas.openxmlformats.org/presentationml/2006/main">
+  <p:cSld>
+    <p:spTree>
+      <p:nvGrpSpPr>
+        <p:cNvPr id="1" name=""/>
+        <p:cNvGrpSpPr/>
+        <p:nvPr/>
+      </p:nvGrpSpPr>
+      <p:grpSpPr>
+        <a:xfrm>
+          <a:off x="0" y="0"/>
+          <a:ext cx="0" cy="0"/>
+          <a:chOff x="0" y="0"/>
+          <a:chExt cx="0" cy="0"/>
+        </a:xfrm>
+      </p:grpSpPr>
+      <p:sp>
+        <p:nvSpPr>
+          <p:cNvPr id="2" name="Title 1"/>
+          <p:cNvSpPr>
+            <a:spLocks noGrp="1"/>
+          </p:cNvSpPr>
+          <p:nvPr>
+            <p:ph type="title"/>
+          </p:nvPr>
+        </p:nvSpPr>
+        <p:spPr/>
+        <p:txBody>
+          <a:bodyPr/>
+          <a:lstStyle/>
+          <a:p>
+            <a:r>
+              <a:rPr lang="en-US" smtClean="0"/>
               <a:t>Accessing Array Elements with *</a:t>
             </a:r>
             <a:endParaRPr lang="en-US"/>
@@ -5139,7 +5772,7 @@
 </p:sld>
 </file>
 
-<file path=ppt/slides/slide12.xml><?xml version="1.0" encoding="utf-8"?>
+<file path=ppt/slides/slide13.xml><?xml version="1.0" encoding="utf-8"?>
 <p:sld xmlns:a="http://schemas.openxmlformats.org/drawingml/2006/main" xmlns:r="http://schemas.openxmlformats.org/officeDocument/2006/relationships" xmlns:p="http://schemas.openxmlformats.org/presentationml/2006/main">
   <p:cSld>
     <p:spTree>
@@ -6004,7 +6637,7 @@
 </p:sld>
 </file>
 
-<file path=ppt/slides/slide13.xml><?xml version="1.0" encoding="utf-8"?>
+<file path=ppt/slides/slide14.xml><?xml version="1.0" encoding="utf-8"?>
 <p:sld xmlns:a="http://schemas.openxmlformats.org/drawingml/2006/main" xmlns:r="http://schemas.openxmlformats.org/officeDocument/2006/relationships" xmlns:p="http://schemas.openxmlformats.org/presentationml/2006/main">
   <p:cSld>
     <p:spTree>
@@ -6670,7 +7303,7 @@
 </p:sld>
 </file>
 
-<file path=ppt/slides/slide14.xml><?xml version="1.0" encoding="utf-8"?>
+<file path=ppt/slides/slide15.xml><?xml version="1.0" encoding="utf-8"?>
 <p:sld xmlns:a="http://schemas.openxmlformats.org/drawingml/2006/main" xmlns:r="http://schemas.openxmlformats.org/officeDocument/2006/relationships" xmlns:p="http://schemas.openxmlformats.org/presentationml/2006/main">
   <p:cSld>
     <p:spTree>
@@ -9625,7 +10258,7 @@
 </p:sld>
 </file>
 
-<file path=ppt/slides/slide15.xml><?xml version="1.0" encoding="utf-8"?>
+<file path=ppt/slides/slide16.xml><?xml version="1.0" encoding="utf-8"?>
 <p:sld xmlns:a="http://schemas.openxmlformats.org/drawingml/2006/main" xmlns:r="http://schemas.openxmlformats.org/officeDocument/2006/relationships" xmlns:p="http://schemas.openxmlformats.org/presentationml/2006/main">
   <p:cSld>
     <p:spTree>
@@ -9728,7 +10361,7 @@
 </p:sld>
 </file>
 
-<file path=ppt/slides/slide16.xml><?xml version="1.0" encoding="utf-8"?>
+<file path=ppt/slides/slide17.xml><?xml version="1.0" encoding="utf-8"?>
 <p:sld xmlns:a="http://schemas.openxmlformats.org/drawingml/2006/main" xmlns:r="http://schemas.openxmlformats.org/officeDocument/2006/relationships" xmlns:p="http://schemas.openxmlformats.org/presentationml/2006/main">
   <p:cSld>
     <p:spTree>
@@ -10606,7 +11239,7 @@
 </p:sld>
 </file>
 
-<file path=ppt/slides/slide17.xml><?xml version="1.0" encoding="utf-8"?>
+<file path=ppt/slides/slide18.xml><?xml version="1.0" encoding="utf-8"?>
 <p:sld xmlns:a="http://schemas.openxmlformats.org/drawingml/2006/main" xmlns:r="http://schemas.openxmlformats.org/officeDocument/2006/relationships" xmlns:p="http://schemas.openxmlformats.org/presentationml/2006/main">
   <p:cSld>
     <p:spTree>
@@ -11187,7 +11820,7 @@
 </p:sld>
 </file>
 
-<file path=ppt/slides/slide18.xml><?xml version="1.0" encoding="utf-8"?>
+<file path=ppt/slides/slide19.xml><?xml version="1.0" encoding="utf-8"?>
 <p:sld xmlns:a="http://schemas.openxmlformats.org/drawingml/2006/main" xmlns:r="http://schemas.openxmlformats.org/officeDocument/2006/relationships" xmlns:p="http://schemas.openxmlformats.org/presentationml/2006/main">
   <p:cSld>
     <p:spTree>
@@ -11583,17 +12216,14 @@
             </a:r>
             <a:r>
               <a:rPr lang="en-US" smtClean="0"/>
-              <a:t>strings</a:t>
-            </a:r>
+              <a:t>arrays as strings</a:t>
+            </a:r>
+            <a:endParaRPr lang="en-US" smtClean="0"/>
           </a:p>
           <a:p>
             <a:r>
               <a:rPr lang="en-US" smtClean="0"/>
-              <a:t>Advanced </a:t>
-            </a:r>
-            <a:r>
-              <a:rPr lang="en-US" smtClean="0"/>
-              <a:t>topics</a:t>
+              <a:t>Advanced topics</a:t>
             </a:r>
             <a:endParaRPr lang="en-US"/>
           </a:p>
@@ -11609,6 +12239,13 @@
   <p:clrMapOvr>
     <a:masterClrMapping/>
   </p:clrMapOvr>
+  <p:timing>
+    <p:tnLst>
+      <p:par>
+        <p:cTn id="1" dur="indefinite" restart="never" nodeType="tmRoot"/>
+      </p:par>
+    </p:tnLst>
+  </p:timing>
 </p:sld>
 </file>
 
@@ -18353,11 +18990,7 @@
             </a:pPr>
             <a:r>
               <a:rPr lang="en-US" smtClean="0"/>
-              <a:t>Don’t forget to initialize </a:t>
-            </a:r>
-            <a:r>
-              <a:rPr lang="en-US" smtClean="0"/>
-              <a:t>an array to use the memory allocated to it.</a:t>
+              <a:t>Don’t forget to initialize an array to use the memory allocated to it.</a:t>
             </a:r>
           </a:p>
           <a:p>
@@ -19997,7 +20630,6 @@
               <a:rPr lang="en-US" smtClean="0"/>
               <a:t>:</a:t>
             </a:r>
-            <a:endParaRPr lang="en-US" smtClean="0"/>
           </a:p>
           <a:p>
             <a:pPr marL="0" indent="0">
@@ -21948,11 +22580,7 @@
           <a:p>
             <a:r>
               <a:rPr lang="en-US" smtClean="0"/>
-              <a:t>Allows for quick, direct access to memory through mathematical </a:t>
-            </a:r>
-            <a:r>
-              <a:rPr lang="en-US" smtClean="0"/>
-              <a:t>addition</a:t>
+              <a:t>Allows for quick, direct access to memory through mathematical addition</a:t>
             </a:r>
           </a:p>
           <a:p>
@@ -21964,11 +22592,6 @@
               </a:rPr>
               <a:t>NOTE: C++ does not perform array bounds checking!</a:t>
             </a:r>
-            <a:endParaRPr lang="en-US" smtClean="0">
-              <a:solidFill>
-                <a:srgbClr val="FF0000"/>
-              </a:solidFill>
-            </a:endParaRPr>
           </a:p>
         </p:txBody>
       </p:sp>

</xml_diff>

<commit_message>
MInor fix on a slide.
</commit_message>
<xml_diff>
--- a/ARCC/intro_to_arrays_in_cpp/intro_to_arrays_in_cpp.pptx
+++ b/ARCC/intro_to_arrays_in_cpp/intro_to_arrays_in_cpp.pptx
@@ -215,7 +215,7 @@
           <a:p>
             <a:fld id="{6540A87B-23EA-4610-975C-A64FB63536A3}" type="datetimeFigureOut">
               <a:rPr lang="en-US" smtClean="0"/>
-              <a:t>12/29/2015</a:t>
+              <a:t>12/30/2015</a:t>
             </a:fld>
             <a:endParaRPr lang="en-US"/>
           </a:p>
@@ -529,6 +529,98 @@
           <a:p>
             <a:r>
               <a:rPr lang="en-US" smtClean="0"/>
+              <a:t>Arrays are 0-based.  The first element is actually index</a:t>
+            </a:r>
+            <a:r>
+              <a:rPr lang="en-US" baseline="0" smtClean="0"/>
+              <a:t> #0.</a:t>
+            </a:r>
+            <a:endParaRPr lang="en-US"/>
+          </a:p>
+        </p:txBody>
+      </p:sp>
+      <p:sp>
+        <p:nvSpPr>
+          <p:cNvPr id="4" name="Slide Number Placeholder 3"/>
+          <p:cNvSpPr>
+            <a:spLocks noGrp="1"/>
+          </p:cNvSpPr>
+          <p:nvPr>
+            <p:ph type="sldNum" sz="quarter" idx="10"/>
+          </p:nvPr>
+        </p:nvSpPr>
+        <p:spPr/>
+        <p:txBody>
+          <a:bodyPr/>
+          <a:lstStyle/>
+          <a:p>
+            <a:fld id="{DD212147-331D-4779-A061-80E15BA42A4A}" type="slidenum">
+              <a:rPr lang="en-US" smtClean="0"/>
+              <a:t>4</a:t>
+            </a:fld>
+            <a:endParaRPr lang="en-US"/>
+          </a:p>
+        </p:txBody>
+      </p:sp>
+    </p:spTree>
+    <p:extLst>
+      <p:ext uri="{BB962C8B-B14F-4D97-AF65-F5344CB8AC3E}">
+        <p14:creationId xmlns:p14="http://schemas.microsoft.com/office/powerpoint/2010/main" val="643045363"/>
+      </p:ext>
+    </p:extLst>
+  </p:cSld>
+  <p:clrMapOvr>
+    <a:masterClrMapping/>
+  </p:clrMapOvr>
+</p:notes>
+</file>
+
+<file path=ppt/notesSlides/notesSlide2.xml><?xml version="1.0" encoding="utf-8"?>
+<p:notes xmlns:a="http://schemas.openxmlformats.org/drawingml/2006/main" xmlns:r="http://schemas.openxmlformats.org/officeDocument/2006/relationships" xmlns:p="http://schemas.openxmlformats.org/presentationml/2006/main">
+  <p:cSld>
+    <p:spTree>
+      <p:nvGrpSpPr>
+        <p:cNvPr id="1" name=""/>
+        <p:cNvGrpSpPr/>
+        <p:nvPr/>
+      </p:nvGrpSpPr>
+      <p:grpSpPr>
+        <a:xfrm>
+          <a:off x="0" y="0"/>
+          <a:ext cx="0" cy="0"/>
+          <a:chOff x="0" y="0"/>
+          <a:chExt cx="0" cy="0"/>
+        </a:xfrm>
+      </p:grpSpPr>
+      <p:sp>
+        <p:nvSpPr>
+          <p:cNvPr id="2" name="Slide Image Placeholder 1"/>
+          <p:cNvSpPr>
+            <a:spLocks noGrp="1" noRot="1" noChangeAspect="1"/>
+          </p:cNvSpPr>
+          <p:nvPr>
+            <p:ph type="sldImg"/>
+          </p:nvPr>
+        </p:nvSpPr>
+        <p:spPr/>
+      </p:sp>
+      <p:sp>
+        <p:nvSpPr>
+          <p:cNvPr id="3" name="Notes Placeholder 2"/>
+          <p:cNvSpPr>
+            <a:spLocks noGrp="1"/>
+          </p:cNvSpPr>
+          <p:nvPr>
+            <p:ph type="body" idx="1"/>
+          </p:nvPr>
+        </p:nvSpPr>
+        <p:spPr/>
+        <p:txBody>
+          <a:bodyPr/>
+          <a:lstStyle/>
+          <a:p>
+            <a:r>
+              <a:rPr lang="en-US" smtClean="0"/>
               <a:t>Indexes must be a “counting” type variable </a:t>
             </a:r>
             <a:r>
@@ -543,19 +635,11 @@
           <a:p>
             <a:r>
               <a:rPr lang="en-US" smtClean="0"/>
-              <a:t>Offset </a:t>
-            </a:r>
-            <a:r>
-              <a:rPr lang="en-US" smtClean="0"/>
-              <a:t>operator</a:t>
+              <a:t>Offset operator</a:t>
             </a:r>
             <a:r>
               <a:rPr lang="en-US" baseline="0" smtClean="0"/>
-              <a:t> is a special dereference operator</a:t>
-            </a:r>
-            <a:r>
-              <a:rPr lang="en-US" baseline="0" smtClean="0"/>
-              <a:t>.</a:t>
+              <a:t> is a special dereference operator.</a:t>
             </a:r>
             <a:endParaRPr lang="en-US"/>
           </a:p>
@@ -728,7 +812,7 @@
           <a:p>
             <a:fld id="{D852F0DB-ACE2-4427-8DE7-5959E4CEB239}" type="datetimeFigureOut">
               <a:rPr lang="en-US" smtClean="0"/>
-              <a:t>12/29/2015</a:t>
+              <a:t>12/30/2015</a:t>
             </a:fld>
             <a:endParaRPr lang="en-US"/>
           </a:p>
@@ -898,7 +982,7 @@
           <a:p>
             <a:fld id="{D852F0DB-ACE2-4427-8DE7-5959E4CEB239}" type="datetimeFigureOut">
               <a:rPr lang="en-US" smtClean="0"/>
-              <a:t>12/29/2015</a:t>
+              <a:t>12/30/2015</a:t>
             </a:fld>
             <a:endParaRPr lang="en-US"/>
           </a:p>
@@ -1078,7 +1162,7 @@
           <a:p>
             <a:fld id="{D852F0DB-ACE2-4427-8DE7-5959E4CEB239}" type="datetimeFigureOut">
               <a:rPr lang="en-US" smtClean="0"/>
-              <a:t>12/29/2015</a:t>
+              <a:t>12/30/2015</a:t>
             </a:fld>
             <a:endParaRPr lang="en-US"/>
           </a:p>
@@ -1248,7 +1332,7 @@
           <a:p>
             <a:fld id="{D852F0DB-ACE2-4427-8DE7-5959E4CEB239}" type="datetimeFigureOut">
               <a:rPr lang="en-US" smtClean="0"/>
-              <a:t>12/29/2015</a:t>
+              <a:t>12/30/2015</a:t>
             </a:fld>
             <a:endParaRPr lang="en-US"/>
           </a:p>
@@ -1494,7 +1578,7 @@
           <a:p>
             <a:fld id="{D852F0DB-ACE2-4427-8DE7-5959E4CEB239}" type="datetimeFigureOut">
               <a:rPr lang="en-US" smtClean="0"/>
-              <a:t>12/29/2015</a:t>
+              <a:t>12/30/2015</a:t>
             </a:fld>
             <a:endParaRPr lang="en-US"/>
           </a:p>
@@ -1726,7 +1810,7 @@
           <a:p>
             <a:fld id="{D852F0DB-ACE2-4427-8DE7-5959E4CEB239}" type="datetimeFigureOut">
               <a:rPr lang="en-US" smtClean="0"/>
-              <a:t>12/29/2015</a:t>
+              <a:t>12/30/2015</a:t>
             </a:fld>
             <a:endParaRPr lang="en-US"/>
           </a:p>
@@ -2093,7 +2177,7 @@
           <a:p>
             <a:fld id="{D852F0DB-ACE2-4427-8DE7-5959E4CEB239}" type="datetimeFigureOut">
               <a:rPr lang="en-US" smtClean="0"/>
-              <a:t>12/29/2015</a:t>
+              <a:t>12/30/2015</a:t>
             </a:fld>
             <a:endParaRPr lang="en-US"/>
           </a:p>
@@ -2211,7 +2295,7 @@
           <a:p>
             <a:fld id="{D852F0DB-ACE2-4427-8DE7-5959E4CEB239}" type="datetimeFigureOut">
               <a:rPr lang="en-US" smtClean="0"/>
-              <a:t>12/29/2015</a:t>
+              <a:t>12/30/2015</a:t>
             </a:fld>
             <a:endParaRPr lang="en-US"/>
           </a:p>
@@ -2306,7 +2390,7 @@
           <a:p>
             <a:fld id="{D852F0DB-ACE2-4427-8DE7-5959E4CEB239}" type="datetimeFigureOut">
               <a:rPr lang="en-US" smtClean="0"/>
-              <a:t>12/29/2015</a:t>
+              <a:t>12/30/2015</a:t>
             </a:fld>
             <a:endParaRPr lang="en-US"/>
           </a:p>
@@ -2583,7 +2667,7 @@
           <a:p>
             <a:fld id="{D852F0DB-ACE2-4427-8DE7-5959E4CEB239}" type="datetimeFigureOut">
               <a:rPr lang="en-US" smtClean="0"/>
-              <a:t>12/29/2015</a:t>
+              <a:t>12/30/2015</a:t>
             </a:fld>
             <a:endParaRPr lang="en-US"/>
           </a:p>
@@ -2836,7 +2920,7 @@
           <a:p>
             <a:fld id="{D852F0DB-ACE2-4427-8DE7-5959E4CEB239}" type="datetimeFigureOut">
               <a:rPr lang="en-US" smtClean="0"/>
-              <a:t>12/29/2015</a:t>
+              <a:t>12/30/2015</a:t>
             </a:fld>
             <a:endParaRPr lang="en-US"/>
           </a:p>
@@ -3049,7 +3133,7 @@
           <a:p>
             <a:fld id="{D852F0DB-ACE2-4427-8DE7-5959E4CEB239}" type="datetimeFigureOut">
               <a:rPr lang="en-US" smtClean="0"/>
-              <a:t>12/29/2015</a:t>
+              <a:t>12/30/2015</a:t>
             </a:fld>
             <a:endParaRPr lang="en-US"/>
           </a:p>
@@ -3784,14 +3868,7 @@
                 <a:latin typeface="Courier New" panose="02070309020205020404" pitchFamily="49" charset="0"/>
                 <a:cs typeface="Courier New" panose="02070309020205020404" pitchFamily="49" charset="0"/>
               </a:rPr>
-              <a:t>cout &lt;&lt; "Sum of values : " &lt;&lt; arraySum &lt;&lt; </a:t>
-            </a:r>
-            <a:r>
-              <a:rPr lang="en-US" sz="1400">
-                <a:latin typeface="Courier New" panose="02070309020205020404" pitchFamily="49" charset="0"/>
-                <a:cs typeface="Courier New" panose="02070309020205020404" pitchFamily="49" charset="0"/>
-              </a:rPr>
-              <a:t>endl</a:t>
+              <a:t>cout &lt;&lt; "Sum of values : " &lt;&lt; arraySum &lt;&lt; endl</a:t>
             </a:r>
             <a:r>
               <a:rPr lang="en-US" sz="1400" smtClean="0">
@@ -3819,14 +3896,7 @@
                 <a:latin typeface="Courier New" panose="02070309020205020404" pitchFamily="49" charset="0"/>
                 <a:cs typeface="Courier New" panose="02070309020205020404" pitchFamily="49" charset="0"/>
               </a:rPr>
-              <a:t>OUTPUT</a:t>
-            </a:r>
-            <a:r>
-              <a:rPr lang="en-US" sz="1400" b="1" smtClean="0">
-                <a:latin typeface="Courier New" panose="02070309020205020404" pitchFamily="49" charset="0"/>
-                <a:cs typeface="Courier New" panose="02070309020205020404" pitchFamily="49" charset="0"/>
-              </a:rPr>
-              <a:t>:</a:t>
+              <a:t>OUTPUT:</a:t>
             </a:r>
           </a:p>
           <a:p>
@@ -3852,10 +3922,6 @@
               </a:rPr>
               <a:t>Sum of values : 190</a:t>
             </a:r>
-            <a:endParaRPr lang="en-US" sz="1400">
-              <a:latin typeface="Courier New" panose="02070309020205020404" pitchFamily="49" charset="0"/>
-              <a:cs typeface="Courier New" panose="02070309020205020404" pitchFamily="49" charset="0"/>
-            </a:endParaRPr>
           </a:p>
         </p:txBody>
       </p:sp>
@@ -3980,17 +4046,7 @@
                 <a:latin typeface="Courier New" panose="02070309020205020404" pitchFamily="49" charset="0"/>
                 <a:cs typeface="Courier New" panose="02070309020205020404" pitchFamily="49" charset="0"/>
               </a:rPr>
-              <a:t>int examScores[100] </a:t>
-            </a:r>
-            <a:r>
-              <a:rPr lang="en-US" b="1">
-                <a:solidFill>
-                  <a:srgbClr val="FF0000"/>
-                </a:solidFill>
-                <a:latin typeface="Courier New" panose="02070309020205020404" pitchFamily="49" charset="0"/>
-                <a:cs typeface="Courier New" panose="02070309020205020404" pitchFamily="49" charset="0"/>
-              </a:rPr>
-              <a:t>= </a:t>
+              <a:t>int examScores[100] = </a:t>
             </a:r>
             <a:r>
               <a:rPr lang="en-US" b="1" smtClean="0">
@@ -4037,14 +4093,7 @@
                 <a:latin typeface="Courier New" panose="02070309020205020404" pitchFamily="49" charset="0"/>
                 <a:cs typeface="Courier New" panose="02070309020205020404" pitchFamily="49" charset="0"/>
               </a:rPr>
-              <a:t>random exam scores to simulate input of </a:t>
-            </a:r>
-            <a:r>
-              <a:rPr lang="en-US">
-                <a:latin typeface="Courier New" panose="02070309020205020404" pitchFamily="49" charset="0"/>
-                <a:cs typeface="Courier New" panose="02070309020205020404" pitchFamily="49" charset="0"/>
-              </a:rPr>
-              <a:t>A </a:t>
+              <a:t>random exam scores to simulate input of A </a:t>
             </a:r>
             <a:r>
               <a:rPr lang="en-US" smtClean="0">
@@ -4276,14 +4325,7 @@
                 <a:latin typeface="Courier New" panose="02070309020205020404" pitchFamily="49" charset="0"/>
                 <a:cs typeface="Courier New" panose="02070309020205020404" pitchFamily="49" charset="0"/>
               </a:rPr>
-              <a:t>cout &lt;&lt; "Average Exam Score: " &lt;&lt; averageExamScore &lt;&lt; </a:t>
-            </a:r>
-            <a:r>
-              <a:rPr lang="en-US">
-                <a:latin typeface="Courier New" panose="02070309020205020404" pitchFamily="49" charset="0"/>
-                <a:cs typeface="Courier New" panose="02070309020205020404" pitchFamily="49" charset="0"/>
-              </a:rPr>
-              <a:t>endl</a:t>
+              <a:t>cout &lt;&lt; "Average Exam Score: " &lt;&lt; averageExamScore &lt;&lt; endl</a:t>
             </a:r>
             <a:r>
               <a:rPr lang="en-US" smtClean="0">
@@ -9694,7 +9736,7 @@
           <p:nvPr>
             <p:extLst>
               <p:ext uri="{D42A27DB-BD31-4B8C-83A1-F6EECF244321}">
-                <p14:modId xmlns:p14="http://schemas.microsoft.com/office/powerpoint/2010/main" val="1800668696"/>
+                <p14:modId xmlns:p14="http://schemas.microsoft.com/office/powerpoint/2010/main" val="4241366826"/>
               </p:ext>
             </p:extLst>
           </p:nvPr>
@@ -9741,7 +9783,14 @@
                           <a:latin typeface="Courier New" panose="02070309020205020404" pitchFamily="49" charset="0"/>
                           <a:cs typeface="Courier New" panose="02070309020205020404" pitchFamily="49" charset="0"/>
                         </a:rPr>
-                        <a:t>’c’,’d’,’e’,’\0’};</a:t>
+                        <a:t>’c’,’d’,’e</a:t>
+                      </a:r>
+                      <a:r>
+                        <a:rPr lang="en-US" sz="1400" baseline="0" smtClean="0">
+                          <a:latin typeface="Courier New" panose="02070309020205020404" pitchFamily="49" charset="0"/>
+                          <a:cs typeface="Courier New" panose="02070309020205020404" pitchFamily="49" charset="0"/>
+                        </a:rPr>
+                        <a:t>’,’f’};</a:t>
                       </a:r>
                       <a:endParaRPr lang="en-US" sz="1400">
                         <a:latin typeface="Courier New" panose="02070309020205020404" pitchFamily="49" charset="0"/>
@@ -12212,13 +12261,8 @@
           <a:p>
             <a:r>
               <a:rPr lang="en-US" smtClean="0"/>
-              <a:t>Character </a:t>
-            </a:r>
-            <a:r>
-              <a:rPr lang="en-US" smtClean="0"/>
-              <a:t>arrays as strings</a:t>
-            </a:r>
-            <a:endParaRPr lang="en-US" smtClean="0"/>
+              <a:t>Character arrays as strings</a:t>
+            </a:r>
           </a:p>
           <a:p>
             <a:r>

</xml_diff>